<commit_message>
Doc updates + PDFs
</commit_message>
<xml_diff>
--- a/BusinessLogic/Docs/EdaWorkshop_Sprint1.pptx
+++ b/BusinessLogic/Docs/EdaWorkshop_Sprint1.pptx
@@ -254,7 +254,7 @@
           <a:p>
             <a:fld id="{0B5D536D-AE8C-4EAC-8CEB-B18A64A144B4}" type="datetimeFigureOut">
               <a:rPr lang="en-US" smtClean="0"/>
-              <a:t>9/27/2021</a:t>
+              <a:t>10/2/2021</a:t>
             </a:fld>
             <a:endParaRPr lang="en-US"/>
           </a:p>
@@ -424,7 +424,7 @@
           <a:p>
             <a:fld id="{0B5D536D-AE8C-4EAC-8CEB-B18A64A144B4}" type="datetimeFigureOut">
               <a:rPr lang="en-US" smtClean="0"/>
-              <a:t>9/27/2021</a:t>
+              <a:t>10/2/2021</a:t>
             </a:fld>
             <a:endParaRPr lang="en-US"/>
           </a:p>
@@ -604,7 +604,7 @@
           <a:p>
             <a:fld id="{0B5D536D-AE8C-4EAC-8CEB-B18A64A144B4}" type="datetimeFigureOut">
               <a:rPr lang="en-US" smtClean="0"/>
-              <a:t>9/27/2021</a:t>
+              <a:t>10/2/2021</a:t>
             </a:fld>
             <a:endParaRPr lang="en-US"/>
           </a:p>
@@ -774,7 +774,7 @@
           <a:p>
             <a:fld id="{0B5D536D-AE8C-4EAC-8CEB-B18A64A144B4}" type="datetimeFigureOut">
               <a:rPr lang="en-US" smtClean="0"/>
-              <a:t>9/27/2021</a:t>
+              <a:t>10/2/2021</a:t>
             </a:fld>
             <a:endParaRPr lang="en-US"/>
           </a:p>
@@ -1020,7 +1020,7 @@
           <a:p>
             <a:fld id="{0B5D536D-AE8C-4EAC-8CEB-B18A64A144B4}" type="datetimeFigureOut">
               <a:rPr lang="en-US" smtClean="0"/>
-              <a:t>9/27/2021</a:t>
+              <a:t>10/2/2021</a:t>
             </a:fld>
             <a:endParaRPr lang="en-US"/>
           </a:p>
@@ -1252,7 +1252,7 @@
           <a:p>
             <a:fld id="{0B5D536D-AE8C-4EAC-8CEB-B18A64A144B4}" type="datetimeFigureOut">
               <a:rPr lang="en-US" smtClean="0"/>
-              <a:t>9/27/2021</a:t>
+              <a:t>10/2/2021</a:t>
             </a:fld>
             <a:endParaRPr lang="en-US"/>
           </a:p>
@@ -1619,7 +1619,7 @@
           <a:p>
             <a:fld id="{0B5D536D-AE8C-4EAC-8CEB-B18A64A144B4}" type="datetimeFigureOut">
               <a:rPr lang="en-US" smtClean="0"/>
-              <a:t>9/27/2021</a:t>
+              <a:t>10/2/2021</a:t>
             </a:fld>
             <a:endParaRPr lang="en-US"/>
           </a:p>
@@ -1737,7 +1737,7 @@
           <a:p>
             <a:fld id="{0B5D536D-AE8C-4EAC-8CEB-B18A64A144B4}" type="datetimeFigureOut">
               <a:rPr lang="en-US" smtClean="0"/>
-              <a:t>9/27/2021</a:t>
+              <a:t>10/2/2021</a:t>
             </a:fld>
             <a:endParaRPr lang="en-US"/>
           </a:p>
@@ -1832,7 +1832,7 @@
           <a:p>
             <a:fld id="{0B5D536D-AE8C-4EAC-8CEB-B18A64A144B4}" type="datetimeFigureOut">
               <a:rPr lang="en-US" smtClean="0"/>
-              <a:t>9/27/2021</a:t>
+              <a:t>10/2/2021</a:t>
             </a:fld>
             <a:endParaRPr lang="en-US"/>
           </a:p>
@@ -2109,7 +2109,7 @@
           <a:p>
             <a:fld id="{0B5D536D-AE8C-4EAC-8CEB-B18A64A144B4}" type="datetimeFigureOut">
               <a:rPr lang="en-US" smtClean="0"/>
-              <a:t>9/27/2021</a:t>
+              <a:t>10/2/2021</a:t>
             </a:fld>
             <a:endParaRPr lang="en-US"/>
           </a:p>
@@ -2362,7 +2362,7 @@
           <a:p>
             <a:fld id="{0B5D536D-AE8C-4EAC-8CEB-B18A64A144B4}" type="datetimeFigureOut">
               <a:rPr lang="en-US" smtClean="0"/>
-              <a:t>9/27/2021</a:t>
+              <a:t>10/2/2021</a:t>
             </a:fld>
             <a:endParaRPr lang="en-US"/>
           </a:p>
@@ -2575,7 +2575,7 @@
           <a:p>
             <a:fld id="{0B5D536D-AE8C-4EAC-8CEB-B18A64A144B4}" type="datetimeFigureOut">
               <a:rPr lang="en-US" smtClean="0"/>
-              <a:t>9/27/2021</a:t>
+              <a:t>10/2/2021</a:t>
             </a:fld>
             <a:endParaRPr lang="en-US"/>
           </a:p>
@@ -3077,11 +3077,7 @@
             </a:r>
             <a:r>
               <a:rPr lang="en-US" dirty="0" smtClean="0"/>
-              <a:t>ask 1-2: </a:t>
-            </a:r>
-            <a:r>
-              <a:rPr lang="en-US" dirty="0" smtClean="0"/>
-              <a:t>Create Provider Transfer</a:t>
+              <a:t>ask 1-2: Create Provider Transfer</a:t>
             </a:r>
             <a:br>
               <a:rPr lang="en-US" dirty="0" smtClean="0"/>
@@ -3107,7 +3103,7 @@
         <p:spPr/>
         <p:txBody>
           <a:bodyPr>
-            <a:normAutofit lnSpcReduction="10000"/>
+            <a:normAutofit fontScale="85000" lnSpcReduction="20000"/>
           </a:bodyPr>
           <a:lstStyle/>
           <a:p>
@@ -3122,8 +3118,37 @@
           <a:p>
             <a:r>
               <a:rPr lang="en-US" dirty="0" smtClean="0"/>
-              <a:t>Start with ThreeAmigosHealth.sln in Sprint1/Initial</a:t>
-            </a:r>
+              <a:t>Start with ThreeAmigosHealth.sln in </a:t>
+            </a:r>
+            <a:r>
+              <a:rPr lang="en-US" dirty="0" smtClean="0"/>
+              <a:t>Sprint1</a:t>
+            </a:r>
+          </a:p>
+          <a:p>
+            <a:endParaRPr lang="en-US" dirty="0"/>
+          </a:p>
+          <a:p>
+            <a:r>
+              <a:rPr lang="en-US" dirty="0" smtClean="0"/>
+              <a:t>Ensure logged into Azure (via CLI)</a:t>
+            </a:r>
+          </a:p>
+          <a:p>
+            <a:pPr lvl="1"/>
+            <a:r>
+              <a:rPr lang="en-US" dirty="0" smtClean="0"/>
+              <a:t>i.e. </a:t>
+            </a:r>
+            <a:r>
+              <a:rPr lang="en-US" dirty="0" err="1" smtClean="0"/>
+              <a:t>az</a:t>
+            </a:r>
+            <a:r>
+              <a:rPr lang="en-US" dirty="0" smtClean="0"/>
+              <a:t> login</a:t>
+            </a:r>
+            <a:endParaRPr lang="en-US" dirty="0" smtClean="0"/>
           </a:p>
           <a:p>
             <a:endParaRPr lang="en-US" dirty="0" smtClean="0"/>
@@ -3192,11 +3217,7 @@
             </a:r>
             <a:r>
               <a:rPr lang="en-US" dirty="0" smtClean="0"/>
-              <a:t> </a:t>
-            </a:r>
-            <a:r>
-              <a:rPr lang="en-US" dirty="0" smtClean="0"/>
-              <a:t>hub</a:t>
+              <a:t> hub</a:t>
             </a:r>
           </a:p>
           <a:p>
@@ -3297,11 +3318,7 @@
             </a:r>
             <a:r>
               <a:rPr lang="en-US" dirty="0" smtClean="0"/>
-              <a:t>ask 1-3: Deploy </a:t>
-            </a:r>
-            <a:r>
-              <a:rPr lang="en-US" dirty="0" smtClean="0"/>
-              <a:t>Provider Transfer</a:t>
+              <a:t>ask 1-3: Deploy Provider Transfer</a:t>
             </a:r>
             <a:br>
               <a:rPr lang="en-US" dirty="0" smtClean="0"/>
@@ -3351,7 +3368,6 @@
               <a:rPr lang="en-US" b="1" i="1" dirty="0" smtClean="0"/>
               <a:t>App Service name must globally unique</a:t>
             </a:r>
-            <a:endParaRPr lang="en-US" b="1" i="1" dirty="0" smtClean="0"/>
           </a:p>
           <a:p>
             <a:pPr lvl="1"/>
@@ -3411,11 +3427,7 @@
             </a:r>
             <a:r>
               <a:rPr lang="en-US" dirty="0" smtClean="0"/>
-              <a:t> </a:t>
-            </a:r>
-            <a:r>
-              <a:rPr lang="en-US" dirty="0" smtClean="0"/>
-              <a:t>hub</a:t>
+              <a:t> hub</a:t>
             </a:r>
           </a:p>
         </p:txBody>
@@ -3556,7 +3568,6 @@
               <a:rPr lang="en-US" dirty="0" smtClean="0"/>
               <a:t>We are using PaaS options to minimize development and maintenance work</a:t>
             </a:r>
-            <a:endParaRPr lang="en-US" dirty="0" smtClean="0"/>
           </a:p>
           <a:p>
             <a:endParaRPr lang="en-US" dirty="0" smtClean="0"/>
@@ -3669,7 +3680,41 @@
           <a:p>
             <a:r>
               <a:rPr lang="en-US" dirty="0" smtClean="0"/>
-              <a:t>Do we need to ensure Azure emulator installed?</a:t>
+              <a:t>**** Install Azure CLI ****</a:t>
+            </a:r>
+          </a:p>
+          <a:p>
+            <a:endParaRPr lang="en-US" dirty="0"/>
+          </a:p>
+          <a:p>
+            <a:r>
+              <a:rPr lang="en-US" dirty="0" smtClean="0"/>
+              <a:t>??? Include App Insights when </a:t>
+            </a:r>
+            <a:r>
+              <a:rPr lang="en-US" dirty="0" err="1" smtClean="0"/>
+              <a:t>publishin</a:t>
+            </a:r>
+            <a:r>
+              <a:rPr lang="en-US" smtClean="0"/>
+              <a:t>???</a:t>
+            </a:r>
+            <a:endParaRPr lang="en-US" dirty="0" smtClean="0"/>
+          </a:p>
+          <a:p>
+            <a:endParaRPr lang="en-US" dirty="0"/>
+          </a:p>
+          <a:p>
+            <a:endParaRPr lang="en-US" dirty="0" smtClean="0"/>
+          </a:p>
+          <a:p>
+            <a:r>
+              <a:rPr lang="en-US" dirty="0" smtClean="0"/>
+              <a:t>Do </a:t>
+            </a:r>
+            <a:r>
+              <a:rPr lang="en-US" dirty="0" smtClean="0"/>
+              <a:t>we need to ensure Azure emulator installed?</a:t>
             </a:r>
           </a:p>
           <a:p>
@@ -3961,11 +4006,7 @@
           <a:p>
             <a:r>
               <a:rPr lang="en-US" dirty="0" smtClean="0"/>
-              <a:t>We’ll </a:t>
-            </a:r>
-            <a:r>
-              <a:rPr lang="en-US" dirty="0" smtClean="0"/>
-              <a:t>simulate incoming requests for service by generating random requests in the Provider Transfer Service</a:t>
+              <a:t>We’ll simulate incoming requests for service by generating random requests in the Provider Transfer Service</a:t>
             </a:r>
           </a:p>
           <a:p>
@@ -3976,7 +4017,6 @@
               <a:rPr lang="en-US" dirty="0" smtClean="0"/>
               <a:t>What Azure resources to use for message bus and service?</a:t>
             </a:r>
-            <a:endParaRPr lang="en-US" dirty="0" smtClean="0"/>
           </a:p>
           <a:p>
             <a:pPr lvl="1"/>
@@ -4256,7 +4296,6 @@
               <a:rPr lang="en-US" dirty="0" smtClean="0"/>
               <a:t> </a:t>
             </a:r>
-            <a:endParaRPr lang="en-US" dirty="0" smtClean="0"/>
           </a:p>
         </p:txBody>
       </p:sp>
@@ -4796,21 +4835,8 @@
           <a:p>
             <a:r>
               <a:rPr lang="en-US" dirty="0" smtClean="0"/>
-              <a:t>Choosing</a:t>
-            </a:r>
-            <a:r>
-              <a:rPr lang="en-US" dirty="0" smtClean="0"/>
-              <a:t> </a:t>
-            </a:r>
-            <a:r>
-              <a:rPr lang="en-US" dirty="0" smtClean="0"/>
-              <a:t>Event </a:t>
-            </a:r>
-            <a:r>
-              <a:rPr lang="en-US" dirty="0" smtClean="0"/>
-              <a:t>Hub</a:t>
-            </a:r>
-            <a:endParaRPr lang="en-US" dirty="0" smtClean="0"/>
+              <a:t>Choosing Event Hub</a:t>
+            </a:r>
           </a:p>
           <a:p>
             <a:pPr lvl="1"/>
@@ -5017,11 +5043,7 @@
             <a:pPr lvl="1"/>
             <a:r>
               <a:rPr lang="en-US" dirty="0" smtClean="0"/>
-              <a:t>Azure’s </a:t>
-            </a:r>
-            <a:r>
-              <a:rPr lang="en-US" dirty="0" smtClean="0"/>
-              <a:t>event-driven, </a:t>
+              <a:t>Azure’s event-driven, </a:t>
             </a:r>
             <a:r>
               <a:rPr lang="en-US" dirty="0" err="1" smtClean="0"/>
@@ -5029,108 +5051,89 @@
             </a:r>
             <a:r>
               <a:rPr lang="en-US" dirty="0" smtClean="0"/>
-              <a:t> compute </a:t>
-            </a:r>
-            <a:r>
-              <a:rPr lang="en-US" dirty="0" smtClean="0"/>
-              <a:t>option</a:t>
-            </a:r>
+              <a:t> compute option</a:t>
+            </a:r>
+          </a:p>
+          <a:p>
+            <a:pPr lvl="1"/>
+            <a:r>
+              <a:rPr lang="en-US" dirty="0" smtClean="0"/>
+              <a:t>Automatically scales – up to 200 parallel instances</a:t>
+            </a:r>
+          </a:p>
+          <a:p>
+            <a:pPr lvl="1"/>
+            <a:r>
+              <a:rPr lang="en-US" dirty="0" smtClean="0"/>
+              <a:t>We’ll discuss other hosting options in later sprint</a:t>
+            </a:r>
+          </a:p>
+          <a:p>
             <a:endParaRPr lang="en-US" dirty="0" smtClean="0"/>
           </a:p>
           <a:p>
+            <a:r>
+              <a:rPr lang="en-US" dirty="0" smtClean="0"/>
+              <a:t>Possible triggers</a:t>
+            </a:r>
+          </a:p>
+          <a:p>
             <a:pPr lvl="1"/>
             <a:r>
               <a:rPr lang="en-US" dirty="0" smtClean="0"/>
-              <a:t>Automatically </a:t>
-            </a:r>
-            <a:r>
-              <a:rPr lang="en-US" dirty="0" smtClean="0"/>
-              <a:t>scales – up to 200 parallel </a:t>
-            </a:r>
-            <a:r>
-              <a:rPr lang="en-US" dirty="0" smtClean="0"/>
-              <a:t>instances</a:t>
+              <a:t>HTTP call</a:t>
             </a:r>
           </a:p>
           <a:p>
             <a:pPr lvl="1"/>
             <a:r>
               <a:rPr lang="en-US" dirty="0" smtClean="0"/>
-              <a:t>We’ll discuss other hosting options in later sprint</a:t>
-            </a:r>
+              <a:t>Timer</a:t>
+            </a:r>
+          </a:p>
+          <a:p>
+            <a:pPr lvl="1"/>
+            <a:r>
+              <a:rPr lang="en-US" dirty="0" smtClean="0"/>
+              <a:t>Message arrived / event occurred</a:t>
+            </a:r>
+          </a:p>
+          <a:p>
+            <a:pPr lvl="1"/>
+            <a:r>
+              <a:rPr lang="en-US" dirty="0" smtClean="0"/>
+              <a:t>Database record created, updated, or deleted</a:t>
+            </a:r>
+          </a:p>
+          <a:p>
+            <a:pPr lvl="1"/>
+            <a:r>
+              <a:rPr lang="en-US" dirty="0" smtClean="0"/>
+              <a:t>BLOB created, updated, or deleted</a:t>
+            </a:r>
+          </a:p>
+          <a:p>
             <a:endParaRPr lang="en-US" dirty="0" smtClean="0"/>
           </a:p>
           <a:p>
-            <a:endParaRPr lang="en-US" dirty="0" smtClean="0"/>
-          </a:p>
-          <a:p>
-            <a:r>
-              <a:rPr lang="en-US" dirty="0" smtClean="0"/>
-              <a:t>Possible triggers</a:t>
+            <a:r>
+              <a:rPr lang="en-US" dirty="0" smtClean="0"/>
+              <a:t>Most often used in consumption mode – only charged for use</a:t>
             </a:r>
           </a:p>
           <a:p>
             <a:pPr lvl="1"/>
             <a:r>
               <a:rPr lang="en-US" dirty="0" smtClean="0"/>
-              <a:t>HTTP call</a:t>
+              <a:t>Based on number of executions, execution time, and memory used</a:t>
             </a:r>
           </a:p>
           <a:p>
             <a:pPr lvl="1"/>
             <a:r>
               <a:rPr lang="en-US" dirty="0" smtClean="0"/>
-              <a:t>Timer</a:t>
-            </a:r>
-          </a:p>
-          <a:p>
-            <a:pPr lvl="1"/>
-            <a:r>
-              <a:rPr lang="en-US" dirty="0" smtClean="0"/>
-              <a:t>Message arrived / event occurred</a:t>
-            </a:r>
-          </a:p>
-          <a:p>
-            <a:pPr lvl="1"/>
-            <a:r>
-              <a:rPr lang="en-US" dirty="0" smtClean="0"/>
-              <a:t>Database record created, updated, or deleted</a:t>
-            </a:r>
-          </a:p>
-          <a:p>
-            <a:pPr lvl="1"/>
-            <a:r>
-              <a:rPr lang="en-US" dirty="0" smtClean="0"/>
-              <a:t>BLOB created, updated, or deleted</a:t>
-            </a:r>
-          </a:p>
-          <a:p>
-            <a:endParaRPr lang="en-US" dirty="0" smtClean="0"/>
-          </a:p>
-          <a:p>
-            <a:r>
-              <a:rPr lang="en-US" dirty="0" smtClean="0"/>
-              <a:t>Most often used in consumption mode – only charged for use</a:t>
-            </a:r>
-          </a:p>
-          <a:p>
-            <a:pPr lvl="1"/>
-            <a:r>
-              <a:rPr lang="en-US" dirty="0" smtClean="0"/>
-              <a:t>Based on number of executions, execution time, and memory </a:t>
-            </a:r>
-            <a:r>
-              <a:rPr lang="en-US" dirty="0" smtClean="0"/>
-              <a:t>used</a:t>
-            </a:r>
-          </a:p>
-          <a:p>
-            <a:pPr lvl="1"/>
-            <a:r>
-              <a:rPr lang="en-US" dirty="0" smtClean="0"/>
               <a:t>Generally inexpensive for lightweight, infrequently used functionality</a:t>
             </a:r>
-            <a:endParaRPr lang="en-US" dirty="0" smtClean="0"/>
           </a:p>
         </p:txBody>
       </p:sp>
@@ -5249,13 +5252,20 @@
         </p:nvSpPr>
         <p:spPr/>
         <p:txBody>
-          <a:bodyPr/>
-          <a:lstStyle/>
-          <a:p>
-            <a:r>
-              <a:rPr lang="en-US" dirty="0" smtClean="0"/>
-              <a:t>Develop in Azure Portal</a:t>
-            </a:r>
+          <a:bodyPr>
+            <a:normAutofit/>
+          </a:bodyPr>
+          <a:lstStyle/>
+          <a:p>
+            <a:r>
+              <a:rPr lang="en-US" dirty="0" smtClean="0"/>
+              <a:t>Develop in Azure </a:t>
+            </a:r>
+            <a:r>
+              <a:rPr lang="en-US" dirty="0" smtClean="0"/>
+              <a:t>Portal</a:t>
+            </a:r>
+            <a:endParaRPr lang="en-US" dirty="0" smtClean="0"/>
           </a:p>
           <a:p>
             <a:endParaRPr lang="en-US" dirty="0" smtClean="0"/>

</xml_diff>